<commit_message>
updated lection 1 and modifed lection 2
</commit_message>
<xml_diff>
--- a/materials/lec_1/lec_1.pptx
+++ b/materials/lec_1/lec_1.pptx
@@ -226,7 +226,7 @@
           <a:p>
             <a:fld id="{07CCACB0-F8FE-4858-B318-FD65BA258CC9}" type="datetimeFigureOut">
               <a:rPr lang="ru-RU" smtClean="0"/>
-              <a:t>30.10.2017</a:t>
+              <a:t>02.11.2017</a:t>
             </a:fld>
             <a:endParaRPr lang="ru-RU"/>
           </a:p>
@@ -1287,7 +1287,7 @@
           <a:p>
             <a:fld id="{B4C71EC6-210F-42DE-9C53-41977AD35B3D}" type="datetimeFigureOut">
               <a:rPr lang="ru-RU" smtClean="0"/>
-              <a:t>30.10.2017</a:t>
+              <a:t>02.11.2017</a:t>
             </a:fld>
             <a:endParaRPr lang="ru-RU"/>
           </a:p>
@@ -1483,7 +1483,7 @@
           <a:p>
             <a:fld id="{B4C71EC6-210F-42DE-9C53-41977AD35B3D}" type="datetimeFigureOut">
               <a:rPr lang="ru-RU" smtClean="0"/>
-              <a:t>30.10.2017</a:t>
+              <a:t>02.11.2017</a:t>
             </a:fld>
             <a:endParaRPr lang="ru-RU"/>
           </a:p>
@@ -1668,7 +1668,7 @@
           <a:p>
             <a:fld id="{B4C71EC6-210F-42DE-9C53-41977AD35B3D}" type="datetimeFigureOut">
               <a:rPr lang="ru-RU" smtClean="0"/>
-              <a:t>30.10.2017</a:t>
+              <a:t>02.11.2017</a:t>
             </a:fld>
             <a:endParaRPr lang="ru-RU"/>
           </a:p>
@@ -1818,7 +1818,7 @@
           <a:p>
             <a:fld id="{B4C71EC6-210F-42DE-9C53-41977AD35B3D}" type="datetimeFigureOut">
               <a:rPr lang="ru-RU" smtClean="0"/>
-              <a:t>30.10.2017</a:t>
+              <a:t>02.11.2017</a:t>
             </a:fld>
             <a:endParaRPr lang="ru-RU"/>
           </a:p>
@@ -2068,7 +2068,7 @@
           <a:p>
             <a:fld id="{B4C71EC6-210F-42DE-9C53-41977AD35B3D}" type="datetimeFigureOut">
               <a:rPr lang="ru-RU" smtClean="0"/>
-              <a:t>30.10.2017</a:t>
+              <a:t>02.11.2017</a:t>
             </a:fld>
             <a:endParaRPr lang="ru-RU"/>
           </a:p>
@@ -2472,7 +2472,7 @@
           <a:p>
             <a:fld id="{B4C71EC6-210F-42DE-9C53-41977AD35B3D}" type="datetimeFigureOut">
               <a:rPr lang="ru-RU" smtClean="0"/>
-              <a:t>30.10.2017</a:t>
+              <a:t>02.11.2017</a:t>
             </a:fld>
             <a:endParaRPr lang="ru-RU"/>
           </a:p>
@@ -2913,7 +2913,7 @@
           <a:p>
             <a:fld id="{B4C71EC6-210F-42DE-9C53-41977AD35B3D}" type="datetimeFigureOut">
               <a:rPr lang="ru-RU" smtClean="0"/>
-              <a:t>30.10.2017</a:t>
+              <a:t>02.11.2017</a:t>
             </a:fld>
             <a:endParaRPr lang="ru-RU"/>
           </a:p>
@@ -3009,7 +3009,7 @@
           <a:p>
             <a:fld id="{B4C71EC6-210F-42DE-9C53-41977AD35B3D}" type="datetimeFigureOut">
               <a:rPr lang="ru-RU" smtClean="0"/>
-              <a:t>30.10.2017</a:t>
+              <a:t>02.11.2017</a:t>
             </a:fld>
             <a:endParaRPr lang="ru-RU"/>
           </a:p>
@@ -3130,7 +3130,7 @@
           <a:p>
             <a:fld id="{B4C71EC6-210F-42DE-9C53-41977AD35B3D}" type="datetimeFigureOut">
               <a:rPr lang="ru-RU" smtClean="0"/>
-              <a:t>30.10.2017</a:t>
+              <a:t>02.11.2017</a:t>
             </a:fld>
             <a:endParaRPr lang="ru-RU"/>
           </a:p>
@@ -3399,7 +3399,7 @@
           <a:p>
             <a:fld id="{B4C71EC6-210F-42DE-9C53-41977AD35B3D}" type="datetimeFigureOut">
               <a:rPr lang="ru-RU" smtClean="0"/>
-              <a:t>30.10.2017</a:t>
+              <a:t>02.11.2017</a:t>
             </a:fld>
             <a:endParaRPr lang="ru-RU"/>
           </a:p>
@@ -3599,7 +3599,7 @@
           <a:p>
             <a:fld id="{B4C71EC6-210F-42DE-9C53-41977AD35B3D}" type="datetimeFigureOut">
               <a:rPr lang="ru-RU" smtClean="0"/>
-              <a:t>30.10.2017</a:t>
+              <a:t>02.11.2017</a:t>
             </a:fld>
             <a:endParaRPr lang="ru-RU"/>
           </a:p>
@@ -4717,7 +4717,7 @@
           <a:p>
             <a:fld id="{B4C71EC6-210F-42DE-9C53-41977AD35B3D}" type="datetimeFigureOut">
               <a:rPr lang="ru-RU" smtClean="0"/>
-              <a:t>30.10.2017</a:t>
+              <a:t>02.11.2017</a:t>
             </a:fld>
             <a:endParaRPr lang="ru-RU"/>
           </a:p>
@@ -5274,10 +5274,6 @@
               </a:rPr>
               <a:t> CUDA</a:t>
             </a:r>
-            <a:endParaRPr lang="en-US" sz="4000" dirty="0">
-              <a:latin typeface="PT Sans" pitchFamily="34" charset="-52"/>
-              <a:ea typeface="PT Sans" pitchFamily="34" charset="-52"/>
-            </a:endParaRPr>
           </a:p>
         </p:txBody>
       </p:sp>
@@ -6100,12 +6096,22 @@
                 <a:latin typeface="PT Sans" pitchFamily="34" charset="-52"/>
                 <a:ea typeface="PT Sans" pitchFamily="34" charset="-52"/>
               </a:rPr>
-              <a:t>Коммуникация между нитями возможна лишь в пределах одного блока</a:t>
-            </a:r>
-            <a:endParaRPr lang="ru-RU" sz="2800" dirty="0">
-              <a:latin typeface="PT Sans" pitchFamily="34" charset="-52"/>
-              <a:ea typeface="PT Sans" pitchFamily="34" charset="-52"/>
-            </a:endParaRPr>
+              <a:t>Коммуникация и синхронизация нитей возможна </a:t>
+            </a:r>
+            <a:r>
+              <a:rPr lang="ru-RU" sz="2800" dirty="0" smtClean="0">
+                <a:latin typeface="PT Sans" pitchFamily="34" charset="-52"/>
+                <a:ea typeface="PT Sans" pitchFamily="34" charset="-52"/>
+              </a:rPr>
+              <a:t>лишь в пределах одного </a:t>
+            </a:r>
+            <a:r>
+              <a:rPr lang="ru-RU" sz="2800" dirty="0" smtClean="0">
+                <a:latin typeface="PT Sans" pitchFamily="34" charset="-52"/>
+                <a:ea typeface="PT Sans" pitchFamily="34" charset="-52"/>
+              </a:rPr>
+              <a:t>блока</a:t>
+            </a:r>
           </a:p>
         </p:txBody>
       </p:sp>
@@ -6607,8 +6613,8 @@
           </a:p>
         </p:txBody>
       </p:sp>
-      <mc:AlternateContent xmlns:mc="http://schemas.openxmlformats.org/markup-compatibility/2006">
-        <mc:Choice xmlns:a14="http://schemas.microsoft.com/office/drawing/2010/main" Requires="a14">
+      <mc:AlternateContent xmlns:mc="http://schemas.openxmlformats.org/markup-compatibility/2006" xmlns:a14="http://schemas.microsoft.com/office/drawing/2010/main">
+        <mc:Choice Requires="a14">
           <p:sp>
             <p:nvSpPr>
               <p:cNvPr id="13" name="Объект 2"/>
@@ -6801,7 +6807,7 @@
             </p:txBody>
           </p:sp>
         </mc:Choice>
-        <mc:Fallback>
+        <mc:Fallback xmlns="">
           <p:sp>
             <p:nvSpPr>
               <p:cNvPr id="13" name="Объект 2"/>
@@ -7001,21 +7007,7 @@
                 <a:latin typeface="PT Sans" pitchFamily="34" charset="-52"/>
                 <a:ea typeface="PT Sans" pitchFamily="34" charset="-52"/>
               </a:rPr>
-              <a:t>Дополнительные </a:t>
-            </a:r>
-            <a:r>
-              <a:rPr lang="ru-RU" sz="2800" dirty="0" smtClean="0">
-                <a:latin typeface="PT Sans" pitchFamily="34" charset="-52"/>
-                <a:ea typeface="PT Sans" pitchFamily="34" charset="-52"/>
-              </a:rPr>
-              <a:t>типы </a:t>
-            </a:r>
-            <a:r>
-              <a:rPr lang="ru-RU" sz="2800" dirty="0" smtClean="0">
-                <a:latin typeface="PT Sans" pitchFamily="34" charset="-52"/>
-                <a:ea typeface="PT Sans" pitchFamily="34" charset="-52"/>
-              </a:rPr>
-              <a:t>данных</a:t>
+              <a:t>Дополнительные типы данных</a:t>
             </a:r>
             <a:endParaRPr lang="en-US" sz="2800" dirty="0" smtClean="0">
               <a:latin typeface="PT Sans" pitchFamily="34" charset="-52"/>
@@ -7028,21 +7020,7 @@
                 <a:latin typeface="PT Sans" pitchFamily="34" charset="-52"/>
                 <a:ea typeface="PT Sans" pitchFamily="34" charset="-52"/>
               </a:rPr>
-              <a:t>Оператор </a:t>
-            </a:r>
-            <a:r>
-              <a:rPr lang="ru-RU" sz="2800" dirty="0" smtClean="0">
-                <a:latin typeface="PT Sans" pitchFamily="34" charset="-52"/>
-                <a:ea typeface="PT Sans" pitchFamily="34" charset="-52"/>
-              </a:rPr>
-              <a:t>запуска </a:t>
-            </a:r>
-            <a:r>
-              <a:rPr lang="ru-RU" sz="2800" dirty="0" smtClean="0">
-                <a:latin typeface="PT Sans" pitchFamily="34" charset="-52"/>
-                <a:ea typeface="PT Sans" pitchFamily="34" charset="-52"/>
-              </a:rPr>
-              <a:t>ядра</a:t>
+              <a:t>Оператор запуска ядра</a:t>
             </a:r>
             <a:endParaRPr lang="ru-RU" sz="2800" dirty="0">
               <a:latin typeface="PT Sans" pitchFamily="34" charset="-52"/>
@@ -7188,28 +7166,7 @@
                 <a:latin typeface="PT Sans" pitchFamily="34" charset="-52"/>
                 <a:ea typeface="PT Sans" pitchFamily="34" charset="-52"/>
               </a:rPr>
-              <a:t>Обозначает функцию-ядро - в</a:t>
-            </a:r>
-            <a:r>
-              <a:rPr lang="ru-RU" sz="2400" dirty="0" smtClean="0">
-                <a:latin typeface="PT Sans" pitchFamily="34" charset="-52"/>
-                <a:ea typeface="PT Sans" pitchFamily="34" charset="-52"/>
-              </a:rPr>
-              <a:t>ызываетс</a:t>
-            </a:r>
-            <a:r>
-              <a:rPr lang="ru-RU" sz="2400" dirty="0" smtClean="0">
-                <a:latin typeface="PT Sans" pitchFamily="34" charset="-52"/>
-                <a:ea typeface="PT Sans" pitchFamily="34" charset="-52"/>
-              </a:rPr>
-              <a:t>я с</a:t>
-            </a:r>
-            <a:r>
-              <a:rPr lang="ru-RU" sz="2400" dirty="0" smtClean="0">
-                <a:latin typeface="PT Sans" pitchFamily="34" charset="-52"/>
-                <a:ea typeface="PT Sans" pitchFamily="34" charset="-52"/>
-              </a:rPr>
-              <a:t> хоста исполняется на девайсе</a:t>
+              <a:t>Обозначает функцию-ядро - вызывается с хоста исполняется на девайсе</a:t>
             </a:r>
           </a:p>
           <a:p>
@@ -7483,14 +7440,7 @@
                 <a:latin typeface="PT Sans" pitchFamily="34" charset="-52"/>
                 <a:ea typeface="PT Sans" pitchFamily="34" charset="-52"/>
               </a:rPr>
-              <a:t>C/C</a:t>
-            </a:r>
-            <a:r>
-              <a:rPr lang="en-US" sz="2800" dirty="0" smtClean="0">
-                <a:latin typeface="PT Sans" pitchFamily="34" charset="-52"/>
-                <a:ea typeface="PT Sans" pitchFamily="34" charset="-52"/>
-              </a:rPr>
-              <a:t>++</a:t>
+              <a:t>C/C++</a:t>
             </a:r>
             <a:endParaRPr lang="ru-RU" sz="2800" dirty="0">
               <a:latin typeface="PT Sans" pitchFamily="34" charset="-52"/>
@@ -8055,67 +8005,53 @@
                 <a:latin typeface="PT Sans" pitchFamily="34" charset="-52"/>
                 <a:ea typeface="PT Sans" pitchFamily="34" charset="-52"/>
               </a:rPr>
-              <a:t>Атрибуты переменных определя</a:t>
+              <a:t>Атрибуты переменных определяют в какой памяти</a:t>
+            </a:r>
+            <a:r>
+              <a:rPr lang="en-US" sz="2800" dirty="0" smtClean="0">
+                <a:latin typeface="PT Sans" pitchFamily="34" charset="-52"/>
+                <a:ea typeface="PT Sans" pitchFamily="34" charset="-52"/>
+              </a:rPr>
+              <a:t> GPU</a:t>
             </a:r>
             <a:r>
               <a:rPr lang="ru-RU" sz="2800" dirty="0" smtClean="0">
                 <a:latin typeface="PT Sans" pitchFamily="34" charset="-52"/>
                 <a:ea typeface="PT Sans" pitchFamily="34" charset="-52"/>
               </a:rPr>
-              <a:t>ют в какой памяти</a:t>
+              <a:t> будет размещаться переменная</a:t>
+            </a:r>
+          </a:p>
+          <a:p>
+            <a:r>
+              <a:rPr lang="ru-RU" sz="2800" dirty="0" smtClean="0">
+                <a:latin typeface="PT Sans" pitchFamily="34" charset="-52"/>
+                <a:ea typeface="PT Sans" pitchFamily="34" charset="-52"/>
+              </a:rPr>
+              <a:t>Скорость и способ доступа к переменной сильно варьируется в зависимости от типа размещения</a:t>
+            </a:r>
+          </a:p>
+          <a:p>
+            <a:r>
+              <a:rPr lang="ru-RU" sz="2800" dirty="0" smtClean="0">
+                <a:latin typeface="PT Sans" pitchFamily="34" charset="-52"/>
+                <a:ea typeface="PT Sans" pitchFamily="34" charset="-52"/>
+              </a:rPr>
+              <a:t>Подробнее о памяти </a:t>
             </a:r>
             <a:r>
               <a:rPr lang="en-US" sz="2800" dirty="0" smtClean="0">
                 <a:latin typeface="PT Sans" pitchFamily="34" charset="-52"/>
                 <a:ea typeface="PT Sans" pitchFamily="34" charset="-52"/>
               </a:rPr>
-              <a:t> GPU</a:t>
+              <a:t>GPU </a:t>
             </a:r>
             <a:r>
               <a:rPr lang="ru-RU" sz="2800" dirty="0" smtClean="0">
                 <a:latin typeface="PT Sans" pitchFamily="34" charset="-52"/>
                 <a:ea typeface="PT Sans" pitchFamily="34" charset="-52"/>
               </a:rPr>
-              <a:t> будет размещаться переменная</a:t>
-            </a:r>
-          </a:p>
-          <a:p>
-            <a:r>
-              <a:rPr lang="ru-RU" sz="2800" dirty="0" smtClean="0">
-                <a:latin typeface="PT Sans" pitchFamily="34" charset="-52"/>
-                <a:ea typeface="PT Sans" pitchFamily="34" charset="-52"/>
-              </a:rPr>
-              <a:t>Скорость и способ доступа к переменной сильно варьируется в зависимости от типа размещения</a:t>
-            </a:r>
-          </a:p>
-          <a:p>
-            <a:r>
-              <a:rPr lang="ru-RU" sz="2800" dirty="0" smtClean="0">
-                <a:latin typeface="PT Sans" pitchFamily="34" charset="-52"/>
-                <a:ea typeface="PT Sans" pitchFamily="34" charset="-52"/>
-              </a:rPr>
-              <a:t>Подробнее о памяти </a:t>
-            </a:r>
-            <a:r>
-              <a:rPr lang="en-US" sz="2800" dirty="0" smtClean="0">
-                <a:latin typeface="PT Sans" pitchFamily="34" charset="-52"/>
-                <a:ea typeface="PT Sans" pitchFamily="34" charset="-52"/>
-              </a:rPr>
-              <a:t>GPU </a:t>
-            </a:r>
-            <a:r>
-              <a:rPr lang="ru-RU" sz="2800" dirty="0" smtClean="0">
-                <a:latin typeface="PT Sans" pitchFamily="34" charset="-52"/>
-                <a:ea typeface="PT Sans" pitchFamily="34" charset="-52"/>
-              </a:rPr>
-              <a:t>– в соответствующей лекции</a:t>
-            </a:r>
-            <a:r>
-              <a:rPr lang="ru-RU" sz="2800" dirty="0" smtClean="0">
-                <a:latin typeface="PT Sans" pitchFamily="34" charset="-52"/>
-                <a:ea typeface="PT Sans" pitchFamily="34" charset="-52"/>
-              </a:rPr>
-              <a:t> </a:t>
+              <a:t>– в соответствующей лекции </a:t>
             </a:r>
             <a:endParaRPr lang="en-US" sz="2400" dirty="0" smtClean="0">
               <a:latin typeface="PT Sans" pitchFamily="34" charset="-52"/>
@@ -8196,14 +8132,7 @@
                 <a:latin typeface="PT Sans" pitchFamily="34" charset="-52"/>
                 <a:ea typeface="PT Sans" pitchFamily="34" charset="-52"/>
               </a:rPr>
-              <a:t>Атрибуты </a:t>
-            </a:r>
-            <a:r>
-              <a:rPr lang="ru-RU" sz="4000" dirty="0">
-                <a:latin typeface="PT Sans" pitchFamily="34" charset="-52"/>
-                <a:ea typeface="PT Sans" pitchFamily="34" charset="-52"/>
-              </a:rPr>
-              <a:t>переменных</a:t>
+              <a:t>Атрибуты переменных</a:t>
             </a:r>
             <a:endParaRPr lang="en-US" sz="4000" dirty="0">
               <a:latin typeface="PT Sans" pitchFamily="34" charset="-52"/>
@@ -8420,49 +8349,21 @@
                 <a:latin typeface="PT Sans" pitchFamily="34" charset="-52"/>
                 <a:ea typeface="PT Sans" pitchFamily="34" charset="-52"/>
               </a:rPr>
-              <a:t>char, </a:t>
+              <a:t>char, short, </a:t>
+            </a:r>
+            <a:r>
+              <a:rPr lang="en-US" sz="2800" i="1" dirty="0" err="1" smtClean="0">
+                <a:latin typeface="PT Sans" pitchFamily="34" charset="-52"/>
+                <a:ea typeface="PT Sans" pitchFamily="34" charset="-52"/>
+              </a:rPr>
+              <a:t>int</a:t>
             </a:r>
             <a:r>
               <a:rPr lang="en-US" sz="2800" i="1" dirty="0" smtClean="0">
                 <a:latin typeface="PT Sans" pitchFamily="34" charset="-52"/>
                 <a:ea typeface="PT Sans" pitchFamily="34" charset="-52"/>
               </a:rPr>
-              <a:t>short, </a:t>
-            </a:r>
-            <a:r>
-              <a:rPr lang="en-US" sz="2800" i="1" dirty="0" err="1" smtClean="0">
-                <a:latin typeface="PT Sans" pitchFamily="34" charset="-52"/>
-                <a:ea typeface="PT Sans" pitchFamily="34" charset="-52"/>
-              </a:rPr>
-              <a:t>int</a:t>
-            </a:r>
-            <a:r>
-              <a:rPr lang="en-US" sz="2800" i="1" dirty="0" smtClean="0">
-                <a:latin typeface="PT Sans" pitchFamily="34" charset="-52"/>
-                <a:ea typeface="PT Sans" pitchFamily="34" charset="-52"/>
-              </a:rPr>
-              <a:t>, </a:t>
-            </a:r>
-            <a:r>
-              <a:rPr lang="en-US" sz="2800" i="1" dirty="0" smtClean="0">
-                <a:latin typeface="PT Sans" pitchFamily="34" charset="-52"/>
-                <a:ea typeface="PT Sans" pitchFamily="34" charset="-52"/>
-              </a:rPr>
-              <a:t>long</a:t>
-            </a:r>
-            <a:r>
-              <a:rPr lang="en-US" sz="2800" i="1" dirty="0" smtClean="0">
-                <a:latin typeface="PT Sans" pitchFamily="34" charset="-52"/>
-                <a:ea typeface="PT Sans" pitchFamily="34" charset="-52"/>
-              </a:rPr>
-              <a:t>, </a:t>
-            </a:r>
-            <a:r>
-              <a:rPr lang="en-US" sz="2800" i="1" dirty="0" smtClean="0">
-                <a:latin typeface="PT Sans" pitchFamily="34" charset="-52"/>
-                <a:ea typeface="PT Sans" pitchFamily="34" charset="-52"/>
-              </a:rPr>
-              <a:t>float</a:t>
+              <a:t>, long, float</a:t>
             </a:r>
             <a:r>
               <a:rPr lang="en-US" sz="2800" dirty="0" smtClean="0">
@@ -9517,28 +9418,79 @@
                 <a:latin typeface="PT Sans" pitchFamily="34" charset="-52"/>
                 <a:ea typeface="PT Sans" pitchFamily="34" charset="-52"/>
               </a:rPr>
-              <a:t>индекс текущего блока в сетке </a:t>
+              <a:t>индекс текущего блока в сетке по каждому из </a:t>
+            </a:r>
+            <a:r>
+              <a:rPr lang="ru-RU" sz="2800" dirty="0" smtClean="0">
+                <a:latin typeface="PT Sans" pitchFamily="34" charset="-52"/>
+                <a:ea typeface="PT Sans" pitchFamily="34" charset="-52"/>
+              </a:rPr>
+              <a:t>измерений (</a:t>
             </a:r>
             <a:r>
               <a:rPr lang="ru-RU" sz="2800" dirty="0">
                 <a:latin typeface="PT Sans" pitchFamily="34" charset="-52"/>
                 <a:ea typeface="PT Sans" pitchFamily="34" charset="-52"/>
               </a:rPr>
-              <a:t>по каждому из </a:t>
+              <a:t>тип </a:t>
+            </a:r>
+            <a:r>
+              <a:rPr lang="en-US" sz="2800" i="1" dirty="0">
+                <a:latin typeface="PT Sans" pitchFamily="34" charset="-52"/>
+                <a:ea typeface="PT Sans" pitchFamily="34" charset="-52"/>
+              </a:rPr>
+              <a:t>uint3</a:t>
+            </a:r>
+            <a:r>
+              <a:rPr lang="en-US" sz="2800" dirty="0">
+                <a:latin typeface="PT Sans" pitchFamily="34" charset="-52"/>
+                <a:ea typeface="PT Sans" pitchFamily="34" charset="-52"/>
+              </a:rPr>
+              <a:t>)</a:t>
+            </a:r>
+          </a:p>
+          <a:p>
+            <a:r>
+              <a:rPr lang="en-US" sz="2800" i="1" dirty="0" err="1">
+                <a:latin typeface="PT Sans" pitchFamily="34" charset="-52"/>
+                <a:ea typeface="PT Sans" pitchFamily="34" charset="-52"/>
+              </a:rPr>
+              <a:t>threadIdx</a:t>
+            </a:r>
+            <a:r>
+              <a:rPr lang="en-US" sz="2800" dirty="0">
+                <a:latin typeface="PT Sans" pitchFamily="34" charset="-52"/>
+                <a:ea typeface="PT Sans" pitchFamily="34" charset="-52"/>
+              </a:rPr>
+              <a:t> – </a:t>
+            </a:r>
+            <a:r>
+              <a:rPr lang="ru-RU" sz="2800" dirty="0">
+                <a:latin typeface="PT Sans" pitchFamily="34" charset="-52"/>
+                <a:ea typeface="PT Sans" pitchFamily="34" charset="-52"/>
+              </a:rPr>
+              <a:t>индекс </a:t>
             </a:r>
             <a:r>
               <a:rPr lang="ru-RU" sz="2800" dirty="0" smtClean="0">
                 <a:latin typeface="PT Sans" pitchFamily="34" charset="-52"/>
                 <a:ea typeface="PT Sans" pitchFamily="34" charset="-52"/>
               </a:rPr>
-              <a:t>измерений (</a:t>
+              <a:t>текущей нити </a:t>
             </a:r>
             <a:r>
               <a:rPr lang="ru-RU" sz="2800" dirty="0">
                 <a:latin typeface="PT Sans" pitchFamily="34" charset="-52"/>
                 <a:ea typeface="PT Sans" pitchFamily="34" charset="-52"/>
               </a:rPr>
-              <a:t>тип </a:t>
+              <a:t>в блоке по каждому из измерений </a:t>
+            </a:r>
+            <a:r>
+              <a:rPr lang="ru-RU" sz="2800" dirty="0" smtClean="0">
+                <a:latin typeface="PT Sans" pitchFamily="34" charset="-52"/>
+                <a:ea typeface="PT Sans" pitchFamily="34" charset="-52"/>
+              </a:rPr>
+              <a:t>(тип </a:t>
             </a:r>
             <a:r>
               <a:rPr lang="en-US" sz="2800" i="1" dirty="0">
@@ -9561,7 +9513,7 @@
                 <a:latin typeface="PT Sans" pitchFamily="34" charset="-52"/>
                 <a:ea typeface="PT Sans" pitchFamily="34" charset="-52"/>
               </a:rPr>
-              <a:t>threadIdx</a:t>
+              <a:t>warpSize</a:t>
             </a:r>
             <a:r>
               <a:rPr lang="en-US" sz="2800" dirty="0">
@@ -9575,64 +9527,6 @@
                 <a:latin typeface="PT Sans" pitchFamily="34" charset="-52"/>
                 <a:ea typeface="PT Sans" pitchFamily="34" charset="-52"/>
               </a:rPr>
-              <a:t>индекс </a:t>
-            </a:r>
-            <a:r>
-              <a:rPr lang="ru-RU" sz="2800" dirty="0" smtClean="0">
-                <a:latin typeface="PT Sans" pitchFamily="34" charset="-52"/>
-                <a:ea typeface="PT Sans" pitchFamily="34" charset="-52"/>
-              </a:rPr>
-              <a:t>текущей нити </a:t>
-            </a:r>
-            <a:r>
-              <a:rPr lang="ru-RU" sz="2800" dirty="0">
-                <a:latin typeface="PT Sans" pitchFamily="34" charset="-52"/>
-                <a:ea typeface="PT Sans" pitchFamily="34" charset="-52"/>
-              </a:rPr>
-              <a:t>в блоке по каждому из измерений </a:t>
-            </a:r>
-            <a:r>
-              <a:rPr lang="ru-RU" sz="2800" dirty="0" smtClean="0">
-                <a:latin typeface="PT Sans" pitchFamily="34" charset="-52"/>
-                <a:ea typeface="PT Sans" pitchFamily="34" charset="-52"/>
-              </a:rPr>
-              <a:t>(тип </a:t>
-            </a:r>
-            <a:r>
-              <a:rPr lang="en-US" sz="2800" i="1" dirty="0">
-                <a:latin typeface="PT Sans" pitchFamily="34" charset="-52"/>
-                <a:ea typeface="PT Sans" pitchFamily="34" charset="-52"/>
-              </a:rPr>
-              <a:t>uint3</a:t>
-            </a:r>
-            <a:r>
-              <a:rPr lang="en-US" sz="2800" dirty="0">
-                <a:latin typeface="PT Sans" pitchFamily="34" charset="-52"/>
-                <a:ea typeface="PT Sans" pitchFamily="34" charset="-52"/>
-              </a:rPr>
-              <a:t>)</a:t>
-            </a:r>
-          </a:p>
-          <a:p>
-            <a:r>
-              <a:rPr lang="en-US" sz="2800" i="1" dirty="0" err="1">
-                <a:latin typeface="PT Sans" pitchFamily="34" charset="-52"/>
-                <a:ea typeface="PT Sans" pitchFamily="34" charset="-52"/>
-              </a:rPr>
-              <a:t>warpSize</a:t>
-            </a:r>
-            <a:r>
-              <a:rPr lang="en-US" sz="2800" dirty="0">
-                <a:latin typeface="PT Sans" pitchFamily="34" charset="-52"/>
-                <a:ea typeface="PT Sans" pitchFamily="34" charset="-52"/>
-              </a:rPr>
-              <a:t> – </a:t>
-            </a:r>
-            <a:r>
-              <a:rPr lang="ru-RU" sz="2800" dirty="0">
-                <a:latin typeface="PT Sans" pitchFamily="34" charset="-52"/>
-                <a:ea typeface="PT Sans" pitchFamily="34" charset="-52"/>
-              </a:rPr>
               <a:t>размер </a:t>
             </a:r>
             <a:r>
@@ -9640,14 +9534,7 @@
                 <a:latin typeface="PT Sans" pitchFamily="34" charset="-52"/>
                 <a:ea typeface="PT Sans" pitchFamily="34" charset="-52"/>
               </a:rPr>
-              <a:t>варп</a:t>
-            </a:r>
-            <a:r>
-              <a:rPr lang="ru-RU" sz="2800" dirty="0" err="1" smtClean="0">
-                <a:latin typeface="PT Sans" pitchFamily="34" charset="-52"/>
-                <a:ea typeface="PT Sans" pitchFamily="34" charset="-52"/>
-              </a:rPr>
-              <a:t>а</a:t>
+              <a:t>варпа</a:t>
             </a:r>
             <a:r>
               <a:rPr lang="ru-RU" sz="2800" dirty="0" smtClean="0">
@@ -10459,14 +10346,7 @@
                 <a:latin typeface="PT Sans" pitchFamily="34" charset="-52"/>
                 <a:ea typeface="PT Sans" pitchFamily="34" charset="-52"/>
               </a:rPr>
-              <a:t>возвращает значение типа </a:t>
-            </a:r>
-            <a:r>
-              <a:rPr lang="ru-RU" sz="2800" dirty="0" smtClean="0">
-                <a:latin typeface="PT Sans" pitchFamily="34" charset="-52"/>
-                <a:ea typeface="PT Sans" pitchFamily="34" charset="-52"/>
-              </a:rPr>
-              <a:t>𝑐𝑢𝑑𝑎𝐸𝑟𝑟𝑜𝑟</a:t>
+              <a:t>возвращает значение типа 𝑐𝑢𝑑𝑎𝐸𝑟𝑟𝑜𝑟</a:t>
             </a:r>
             <a:r>
               <a:rPr lang="ru-RU" sz="2800" dirty="0">
@@ -10827,14 +10707,7 @@
                 <a:latin typeface="PT Sans" pitchFamily="34" charset="-52"/>
                 <a:ea typeface="PT Sans" pitchFamily="34" charset="-52"/>
               </a:rPr>
-              <a:t>Асинхронные версии ф</a:t>
-            </a:r>
-            <a:r>
-              <a:rPr lang="ru-RU" sz="2400" dirty="0" smtClean="0">
-                <a:latin typeface="PT Sans" pitchFamily="34" charset="-52"/>
-                <a:ea typeface="PT Sans" pitchFamily="34" charset="-52"/>
-              </a:rPr>
-              <a:t>ункций </a:t>
+              <a:t>Асинхронные версии функций </a:t>
             </a:r>
             <a:r>
               <a:rPr lang="ru-RU" sz="2400" dirty="0">
@@ -11056,15 +10929,7 @@
                 <a:ea typeface="PT Sans" pitchFamily="34" charset="-52"/>
                 <a:hlinkClick r:id="rId2"/>
               </a:rPr>
-              <a:t>https://developer.</a:t>
-            </a:r>
-            <a:r>
-              <a:rPr lang="en-US" sz="2400" dirty="0" smtClean="0">
-                <a:latin typeface="PT Sans" pitchFamily="34" charset="-52"/>
-                <a:ea typeface="PT Sans" pitchFamily="34" charset="-52"/>
-                <a:hlinkClick r:id="rId2"/>
-              </a:rPr>
-              <a:t>nvidia.com/cuda-gpus</a:t>
+              <a:t>https://developer.nvidia.com/cuda-gpus</a:t>
             </a:r>
             <a:endParaRPr lang="ru-RU" sz="2400" dirty="0" smtClean="0">
               <a:latin typeface="PT Sans" pitchFamily="34" charset="-52"/>
@@ -11077,42 +10942,28 @@
                 <a:latin typeface="PT Sans" pitchFamily="34" charset="-52"/>
                 <a:ea typeface="PT Sans" pitchFamily="34" charset="-52"/>
               </a:rPr>
-              <a:t>Каждая </a:t>
+              <a:t>Каждая версия </a:t>
+            </a:r>
+            <a:r>
+              <a:rPr lang="en-US" sz="2800" dirty="0" smtClean="0">
+                <a:latin typeface="PT Sans" pitchFamily="34" charset="-52"/>
+                <a:ea typeface="PT Sans" pitchFamily="34" charset="-52"/>
+              </a:rPr>
+              <a:t>CUDA </a:t>
+            </a:r>
+            <a:r>
+              <a:rPr lang="en-US" sz="2800" dirty="0">
+                <a:latin typeface="PT Sans" pitchFamily="34" charset="-52"/>
+                <a:ea typeface="PT Sans" pitchFamily="34" charset="-52"/>
+              </a:rPr>
+              <a:t>Toolkit </a:t>
             </a:r>
             <a:r>
               <a:rPr lang="ru-RU" sz="2800" dirty="0" smtClean="0">
                 <a:latin typeface="PT Sans" pitchFamily="34" charset="-52"/>
                 <a:ea typeface="PT Sans" pitchFamily="34" charset="-52"/>
               </a:rPr>
-              <a:t>версия </a:t>
-            </a:r>
-            <a:r>
-              <a:rPr lang="en-US" sz="2800" dirty="0" smtClean="0">
-                <a:latin typeface="PT Sans" pitchFamily="34" charset="-52"/>
-                <a:ea typeface="PT Sans" pitchFamily="34" charset="-52"/>
-              </a:rPr>
-              <a:t>CUDA </a:t>
-            </a:r>
-            <a:r>
-              <a:rPr lang="en-US" sz="2800" dirty="0">
-                <a:latin typeface="PT Sans" pitchFamily="34" charset="-52"/>
-                <a:ea typeface="PT Sans" pitchFamily="34" charset="-52"/>
-              </a:rPr>
-              <a:t>Toolkit </a:t>
-            </a:r>
-            <a:r>
-              <a:rPr lang="ru-RU" sz="2800" dirty="0" smtClean="0">
-                <a:latin typeface="PT Sans" pitchFamily="34" charset="-52"/>
-                <a:ea typeface="PT Sans" pitchFamily="34" charset="-52"/>
-              </a:rPr>
-              <a:t>имеет свой список актуальных </a:t>
-            </a:r>
-            <a:r>
-              <a:rPr lang="ru-RU" sz="2800" dirty="0" smtClean="0">
-                <a:latin typeface="PT Sans" pitchFamily="34" charset="-52"/>
-                <a:ea typeface="PT Sans" pitchFamily="34" charset="-52"/>
-              </a:rPr>
-              <a:t>драйверов</a:t>
+              <a:t>имеет свой список актуальных драйверов</a:t>
             </a:r>
             <a:endParaRPr lang="en-US" sz="2800" dirty="0" smtClean="0">
               <a:latin typeface="PT Sans" pitchFamily="34" charset="-52"/>
@@ -11242,42 +11093,21 @@
                 <a:latin typeface="PT Sans" pitchFamily="34" charset="-52"/>
                 <a:ea typeface="PT Sans" pitchFamily="34" charset="-52"/>
               </a:rPr>
-              <a:t>О</a:t>
+              <a:t>Очередь команд для запуска ядер и обмена данными между </a:t>
+            </a:r>
+            <a:r>
+              <a:rPr lang="en-US" sz="2800" dirty="0" smtClean="0">
+                <a:latin typeface="PT Sans" pitchFamily="34" charset="-52"/>
+                <a:ea typeface="PT Sans" pitchFamily="34" charset="-52"/>
+              </a:rPr>
+              <a:t>GPU </a:t>
             </a:r>
             <a:r>
               <a:rPr lang="ru-RU" sz="2800" dirty="0" smtClean="0">
                 <a:latin typeface="PT Sans" pitchFamily="34" charset="-52"/>
                 <a:ea typeface="PT Sans" pitchFamily="34" charset="-52"/>
               </a:rPr>
-              <a:t>чередь </a:t>
-            </a:r>
-            <a:r>
-              <a:rPr lang="ru-RU" sz="2800" dirty="0" smtClean="0">
-                <a:latin typeface="PT Sans" pitchFamily="34" charset="-52"/>
-                <a:ea typeface="PT Sans" pitchFamily="34" charset="-52"/>
-              </a:rPr>
-              <a:t>команд для запуска ядер и обмена данными между </a:t>
-            </a:r>
-            <a:r>
-              <a:rPr lang="en-US" sz="2800" dirty="0" smtClean="0">
-                <a:latin typeface="PT Sans" pitchFamily="34" charset="-52"/>
-                <a:ea typeface="PT Sans" pitchFamily="34" charset="-52"/>
-              </a:rPr>
-              <a:t>GPU </a:t>
-            </a:r>
-            <a:r>
-              <a:rPr lang="ru-RU" sz="2800" dirty="0" smtClean="0">
-                <a:latin typeface="PT Sans" pitchFamily="34" charset="-52"/>
-                <a:ea typeface="PT Sans" pitchFamily="34" charset="-52"/>
-              </a:rPr>
-              <a:t>и </a:t>
-            </a:r>
-            <a:r>
-              <a:rPr lang="ru-RU" sz="2800" dirty="0" smtClean="0">
-                <a:latin typeface="PT Sans" pitchFamily="34" charset="-52"/>
-                <a:ea typeface="PT Sans" pitchFamily="34" charset="-52"/>
-              </a:rPr>
-              <a:t>хостом</a:t>
+              <a:t>и хостом</a:t>
             </a:r>
           </a:p>
           <a:p>
@@ -11484,61 +11314,29 @@
                 <a:latin typeface="PT Sans" pitchFamily="34" charset="-52"/>
                 <a:ea typeface="PT Sans" pitchFamily="34" charset="-52"/>
               </a:rPr>
-              <a:t>Если копирование данных </a:t>
+              <a:t>Если копирование данных хост-девайс</a:t>
+            </a:r>
+            <a:r>
+              <a:rPr lang="ru-RU" sz="2800" dirty="0">
+                <a:latin typeface="PT Sans" pitchFamily="34" charset="-52"/>
+                <a:ea typeface="PT Sans" pitchFamily="34" charset="-52"/>
+              </a:rPr>
+              <a:t>, девайс</a:t>
+            </a:r>
+            <a:r>
+              <a:rPr lang="en-US" sz="2800" dirty="0" smtClean="0">
+                <a:latin typeface="PT Sans" pitchFamily="34" charset="-52"/>
+                <a:ea typeface="PT Sans" pitchFamily="34" charset="-52"/>
+              </a:rPr>
+              <a:t>-</a:t>
             </a:r>
             <a:r>
               <a:rPr lang="ru-RU" sz="2800" dirty="0" smtClean="0">
                 <a:latin typeface="PT Sans" pitchFamily="34" charset="-52"/>
                 <a:ea typeface="PT Sans" pitchFamily="34" charset="-52"/>
               </a:rPr>
-              <a:t>хост-девайс</a:t>
-            </a:r>
-            <a:r>
-              <a:rPr lang="ru-RU" sz="2800" dirty="0">
-                <a:latin typeface="PT Sans" pitchFamily="34" charset="-52"/>
-                <a:ea typeface="PT Sans" pitchFamily="34" charset="-52"/>
-              </a:rPr>
-              <a:t>, девайс</a:t>
-            </a:r>
-            <a:r>
-              <a:rPr lang="en-US" sz="2800" dirty="0" smtClean="0">
-                <a:latin typeface="PT Sans" pitchFamily="34" charset="-52"/>
-                <a:ea typeface="PT Sans" pitchFamily="34" charset="-52"/>
-              </a:rPr>
-              <a:t>-</a:t>
-            </a:r>
-            <a:r>
-              <a:rPr lang="ru-RU" sz="2800" dirty="0" smtClean="0">
-                <a:latin typeface="PT Sans" pitchFamily="34" charset="-52"/>
-                <a:ea typeface="PT Sans" pitchFamily="34" charset="-52"/>
-              </a:rPr>
-              <a:t>хост и работа ядра занимают примерно одинаковое время, </a:t>
-            </a:r>
-            <a:r>
-              <a:rPr lang="ru-RU" sz="2800" dirty="0" smtClean="0">
-                <a:latin typeface="PT Sans" pitchFamily="34" charset="-52"/>
-                <a:ea typeface="PT Sans" pitchFamily="34" charset="-52"/>
-              </a:rPr>
-              <a:t>можно </a:t>
-            </a:r>
-            <a:r>
-              <a:rPr lang="ru-RU" sz="2800" dirty="0" smtClean="0">
-                <a:latin typeface="PT Sans" pitchFamily="34" charset="-52"/>
-                <a:ea typeface="PT Sans" pitchFamily="34" charset="-52"/>
-              </a:rPr>
-              <a:t>получить выигрыш в </a:t>
-            </a:r>
-            <a:r>
-              <a:rPr lang="ru-RU" sz="2800" dirty="0" smtClean="0">
-                <a:latin typeface="PT Sans" pitchFamily="34" charset="-52"/>
-                <a:ea typeface="PT Sans" pitchFamily="34" charset="-52"/>
-              </a:rPr>
-              <a:t>производительности</a:t>
-            </a:r>
-            <a:endParaRPr lang="ru-RU" sz="2800" dirty="0" smtClean="0">
-              <a:latin typeface="PT Sans" pitchFamily="34" charset="-52"/>
-              <a:ea typeface="PT Sans" pitchFamily="34" charset="-52"/>
-            </a:endParaRPr>
+              <a:t>хост и работа ядра занимают примерно одинаковое время, можно получить выигрыш в производительности</a:t>
+            </a:r>
           </a:p>
         </p:txBody>
       </p:sp>
@@ -12271,64 +12069,57 @@
                 <a:latin typeface="PT Sans" pitchFamily="34" charset="-52"/>
                 <a:ea typeface="PT Sans" pitchFamily="34" charset="-52"/>
               </a:rPr>
-              <a:t>Событие – </a:t>
+              <a:t>Событие – объект типа </a:t>
+            </a:r>
+            <a:r>
+              <a:rPr lang="en-US" sz="2800" dirty="0" err="1">
+                <a:latin typeface="PT Sans" pitchFamily="34" charset="-52"/>
+                <a:ea typeface="PT Sans" pitchFamily="34" charset="-52"/>
+              </a:rPr>
+              <a:t>cudaEvent_t</a:t>
+            </a:r>
+            <a:r>
+              <a:rPr lang="en-US" sz="2800" dirty="0">
+                <a:latin typeface="PT Sans" pitchFamily="34" charset="-52"/>
+                <a:ea typeface="PT Sans" pitchFamily="34" charset="-52"/>
+              </a:rPr>
+              <a:t> </a:t>
             </a:r>
             <a:r>
               <a:rPr lang="ru-RU" sz="2800" dirty="0" smtClean="0">
                 <a:latin typeface="PT Sans" pitchFamily="34" charset="-52"/>
                 <a:ea typeface="PT Sans" pitchFamily="34" charset="-52"/>
               </a:rPr>
-              <a:t>объект типа </a:t>
-            </a:r>
-            <a:r>
-              <a:rPr lang="en-US" sz="2800" dirty="0" err="1">
-                <a:latin typeface="PT Sans" pitchFamily="34" charset="-52"/>
-                <a:ea typeface="PT Sans" pitchFamily="34" charset="-52"/>
-              </a:rPr>
-              <a:t>cudaEvent_t</a:t>
-            </a:r>
-            <a:r>
-              <a:rPr lang="en-US" sz="2800" dirty="0">
-                <a:latin typeface="PT Sans" pitchFamily="34" charset="-52"/>
-                <a:ea typeface="PT Sans" pitchFamily="34" charset="-52"/>
-              </a:rPr>
-              <a:t> </a:t>
-            </a:r>
+              <a:t>для измерения времени выполнения операций </a:t>
+            </a:r>
+            <a:r>
+              <a:rPr lang="en-US" sz="2800" dirty="0" smtClean="0">
+                <a:latin typeface="PT Sans" pitchFamily="34" charset="-52"/>
+                <a:ea typeface="PT Sans" pitchFamily="34" charset="-52"/>
+              </a:rPr>
+              <a:t>CUDA</a:t>
+            </a:r>
+          </a:p>
+          <a:p>
             <a:r>
               <a:rPr lang="ru-RU" sz="2800" dirty="0" smtClean="0">
                 <a:latin typeface="PT Sans" pitchFamily="34" charset="-52"/>
                 <a:ea typeface="PT Sans" pitchFamily="34" charset="-52"/>
               </a:rPr>
-              <a:t>для измерения времени выполнения операций </a:t>
+              <a:t>Функции </a:t>
             </a:r>
             <a:r>
               <a:rPr lang="en-US" sz="2800" dirty="0" smtClean="0">
                 <a:latin typeface="PT Sans" pitchFamily="34" charset="-52"/>
                 <a:ea typeface="PT Sans" pitchFamily="34" charset="-52"/>
               </a:rPr>
-              <a:t>CUDA</a:t>
-            </a:r>
-          </a:p>
-          <a:p>
+              <a:t>CUDA API </a:t>
+            </a:r>
             <a:r>
               <a:rPr lang="ru-RU" sz="2800" dirty="0" smtClean="0">
                 <a:latin typeface="PT Sans" pitchFamily="34" charset="-52"/>
                 <a:ea typeface="PT Sans" pitchFamily="34" charset="-52"/>
               </a:rPr>
-              <a:t>Функции </a:t>
-            </a:r>
-            <a:r>
-              <a:rPr lang="en-US" sz="2800" dirty="0" smtClean="0">
-                <a:latin typeface="PT Sans" pitchFamily="34" charset="-52"/>
-                <a:ea typeface="PT Sans" pitchFamily="34" charset="-52"/>
-              </a:rPr>
-              <a:t>CUDA API </a:t>
-            </a:r>
-            <a:r>
-              <a:rPr lang="ru-RU" sz="2800" dirty="0" smtClean="0">
-                <a:latin typeface="PT Sans" pitchFamily="34" charset="-52"/>
-                <a:ea typeface="PT Sans" pitchFamily="34" charset="-52"/>
-              </a:rPr>
               <a:t>позволяют</a:t>
             </a:r>
           </a:p>
@@ -12349,19 +12140,8 @@
                 <a:latin typeface="PT Sans" pitchFamily="34" charset="-52"/>
                 <a:ea typeface="PT Sans" pitchFamily="34" charset="-52"/>
               </a:rPr>
-              <a:t>Выделять начало и конец </a:t>
-            </a:r>
-            <a:r>
-              <a:rPr lang="ru-RU" sz="2400" dirty="0" smtClean="0">
-                <a:latin typeface="PT Sans" pitchFamily="34" charset="-52"/>
-                <a:ea typeface="PT Sans" pitchFamily="34" charset="-52"/>
-              </a:rPr>
-              <a:t>профилируемого кода</a:t>
-            </a:r>
-            <a:endParaRPr lang="ru-RU" sz="2400" dirty="0" smtClean="0">
-              <a:latin typeface="PT Sans" pitchFamily="34" charset="-52"/>
-              <a:ea typeface="PT Sans" pitchFamily="34" charset="-52"/>
-            </a:endParaRPr>
+              <a:t>Выделять начало и конец профилируемого кода</a:t>
+            </a:r>
           </a:p>
           <a:p>
             <a:pPr lvl="1"/>
@@ -12879,10 +12659,6 @@
               </a:rPr>
               <a:t> </a:t>
             </a:r>
-            <a:endParaRPr lang="ru-RU" sz="2400" dirty="0" smtClean="0">
-              <a:latin typeface="PT Sans" pitchFamily="34" charset="-52"/>
-              <a:ea typeface="PT Sans" pitchFamily="34" charset="-52"/>
-            </a:endParaRPr>
           </a:p>
           <a:p>
             <a:r>
@@ -13381,14 +13157,7 @@
                 <a:latin typeface="PT Sans" pitchFamily="34" charset="-52"/>
                 <a:ea typeface="PT Sans" pitchFamily="34" charset="-52"/>
               </a:rPr>
-              <a:t>строковый </a:t>
-            </a:r>
-            <a:r>
-              <a:rPr lang="ru-RU" sz="2800" dirty="0" smtClean="0">
-                <a:latin typeface="PT Sans" pitchFamily="34" charset="-52"/>
-                <a:ea typeface="PT Sans" pitchFamily="34" charset="-52"/>
-              </a:rPr>
-              <a:t>компилятор </a:t>
+              <a:t>строковый компилятор </a:t>
             </a:r>
             <a:r>
               <a:rPr lang="ru-RU" sz="2800" dirty="0">
@@ -14164,14 +13933,7 @@
                 <a:latin typeface="PT Sans" pitchFamily="34" charset="-52"/>
                 <a:ea typeface="PT Sans" pitchFamily="34" charset="-52"/>
               </a:rPr>
-              <a:t> – </a:t>
-            </a:r>
-            <a:r>
-              <a:rPr lang="ru-RU" sz="2400" dirty="0" smtClean="0">
-                <a:latin typeface="PT Sans" pitchFamily="34" charset="-52"/>
-                <a:ea typeface="PT Sans" pitchFamily="34" charset="-52"/>
-              </a:rPr>
-              <a:t>функции исполняемые на </a:t>
+              <a:t> – функции исполняемые на </a:t>
             </a:r>
             <a:r>
               <a:rPr lang="en-US" sz="2400" dirty="0" smtClean="0">

</xml_diff>